<commit_message>
update board.java file: new version of play background music.
</commit_message>
<xml_diff>
--- a/presentation.pptx
+++ b/presentation.pptx
@@ -8,8 +8,14 @@
     <p:sldId id="256" r:id="rId2"/>
     <p:sldId id="257" r:id="rId3"/>
     <p:sldId id="258" r:id="rId4"/>
-    <p:sldId id="259" r:id="rId5"/>
-    <p:sldId id="260" r:id="rId6"/>
+    <p:sldId id="261" r:id="rId5"/>
+    <p:sldId id="259" r:id="rId6"/>
+    <p:sldId id="260" r:id="rId7"/>
+    <p:sldId id="262" r:id="rId8"/>
+    <p:sldId id="263" r:id="rId9"/>
+    <p:sldId id="264" r:id="rId10"/>
+    <p:sldId id="265" r:id="rId11"/>
+    <p:sldId id="266" r:id="rId12"/>
   </p:sldIdLst>
   <p:sldSz cx="12192000" cy="6858000"/>
   <p:notesSz cx="6858000" cy="9144000"/>
@@ -614,7 +620,7 @@
             <a:fld id="{B61BEF0D-F0BB-DE4B-95CE-6DB70DBA9567}" type="datetimeFigureOut">
               <a:rPr lang="en-US" dirty="0"/>
               <a:pPr/>
-              <a:t>10/10/16</a:t>
+              <a:t>10/10/2016</a:t>
             </a:fld>
             <a:endParaRPr lang="en-US" dirty="0"/>
           </a:p>
@@ -907,7 +913,7 @@
             <a:fld id="{B61BEF0D-F0BB-DE4B-95CE-6DB70DBA9567}" type="datetimeFigureOut">
               <a:rPr lang="en-US" dirty="0"/>
               <a:pPr/>
-              <a:t>10/10/16</a:t>
+              <a:t>10/10/2016</a:t>
             </a:fld>
             <a:endParaRPr lang="en-US" dirty="0"/>
           </a:p>
@@ -1152,7 +1158,7 @@
             <a:fld id="{B61BEF0D-F0BB-DE4B-95CE-6DB70DBA9567}" type="datetimeFigureOut">
               <a:rPr lang="en-US" dirty="0"/>
               <a:pPr/>
-              <a:t>10/10/16</a:t>
+              <a:t>10/10/2016</a:t>
             </a:fld>
             <a:endParaRPr lang="en-US" dirty="0"/>
           </a:p>
@@ -1689,7 +1695,7 @@
             <a:fld id="{B61BEF0D-F0BB-DE4B-95CE-6DB70DBA9567}" type="datetimeFigureOut">
               <a:rPr lang="en-US" dirty="0"/>
               <a:pPr/>
-              <a:t>10/10/16</a:t>
+              <a:t>10/10/2016</a:t>
             </a:fld>
             <a:endParaRPr lang="en-US" dirty="0"/>
           </a:p>
@@ -1934,7 +1940,7 @@
             <a:fld id="{B61BEF0D-F0BB-DE4B-95CE-6DB70DBA9567}" type="datetimeFigureOut">
               <a:rPr lang="en-US" dirty="0"/>
               <a:pPr/>
-              <a:t>10/10/16</a:t>
+              <a:t>10/10/2016</a:t>
             </a:fld>
             <a:endParaRPr lang="en-US" dirty="0"/>
           </a:p>
@@ -2463,7 +2469,7 @@
             <a:fld id="{B61BEF0D-F0BB-DE4B-95CE-6DB70DBA9567}" type="datetimeFigureOut">
               <a:rPr lang="en-US" dirty="0"/>
               <a:pPr/>
-              <a:t>10/10/16</a:t>
+              <a:t>10/10/2016</a:t>
             </a:fld>
             <a:endParaRPr lang="en-US" dirty="0"/>
           </a:p>
@@ -2757,7 +2763,7 @@
             <a:fld id="{B61BEF0D-F0BB-DE4B-95CE-6DB70DBA9567}" type="datetimeFigureOut">
               <a:rPr lang="en-US" dirty="0"/>
               <a:pPr/>
-              <a:t>10/10/16</a:t>
+              <a:t>10/10/2016</a:t>
             </a:fld>
             <a:endParaRPr lang="en-US" dirty="0"/>
           </a:p>
@@ -2928,7 +2934,7 @@
             <a:fld id="{B61BEF0D-F0BB-DE4B-95CE-6DB70DBA9567}" type="datetimeFigureOut">
               <a:rPr lang="en-US" dirty="0"/>
               <a:pPr/>
-              <a:t>10/10/16</a:t>
+              <a:t>10/10/2016</a:t>
             </a:fld>
             <a:endParaRPr lang="en-US" dirty="0"/>
           </a:p>
@@ -3105,7 +3111,7 @@
             <a:fld id="{B61BEF0D-F0BB-DE4B-95CE-6DB70DBA9567}" type="datetimeFigureOut">
               <a:rPr lang="en-US" dirty="0"/>
               <a:pPr/>
-              <a:t>10/10/16</a:t>
+              <a:t>10/10/2016</a:t>
             </a:fld>
             <a:endParaRPr lang="en-US" dirty="0"/>
           </a:p>
@@ -3272,7 +3278,7 @@
             <a:fld id="{B61BEF0D-F0BB-DE4B-95CE-6DB70DBA9567}" type="datetimeFigureOut">
               <a:rPr lang="en-US" dirty="0"/>
               <a:pPr/>
-              <a:t>10/10/16</a:t>
+              <a:t>10/10/2016</a:t>
             </a:fld>
             <a:endParaRPr lang="en-US" dirty="0"/>
           </a:p>
@@ -3520,7 +3526,7 @@
             <a:fld id="{B61BEF0D-F0BB-DE4B-95CE-6DB70DBA9567}" type="datetimeFigureOut">
               <a:rPr lang="en-US" dirty="0"/>
               <a:pPr/>
-              <a:t>10/10/16</a:t>
+              <a:t>10/10/2016</a:t>
             </a:fld>
             <a:endParaRPr lang="en-US" dirty="0"/>
           </a:p>
@@ -3814,7 +3820,7 @@
             <a:fld id="{B61BEF0D-F0BB-DE4B-95CE-6DB70DBA9567}" type="datetimeFigureOut">
               <a:rPr lang="en-US" dirty="0"/>
               <a:pPr/>
-              <a:t>10/10/16</a:t>
+              <a:t>10/10/2016</a:t>
             </a:fld>
             <a:endParaRPr lang="en-US" dirty="0"/>
           </a:p>
@@ -4253,7 +4259,7 @@
             <a:fld id="{B61BEF0D-F0BB-DE4B-95CE-6DB70DBA9567}" type="datetimeFigureOut">
               <a:rPr lang="en-US" dirty="0"/>
               <a:pPr/>
-              <a:t>10/10/16</a:t>
+              <a:t>10/10/2016</a:t>
             </a:fld>
             <a:endParaRPr lang="en-US" dirty="0"/>
           </a:p>
@@ -4368,7 +4374,7 @@
             <a:fld id="{B61BEF0D-F0BB-DE4B-95CE-6DB70DBA9567}" type="datetimeFigureOut">
               <a:rPr lang="en-US" dirty="0"/>
               <a:pPr/>
-              <a:t>10/10/16</a:t>
+              <a:t>10/10/2016</a:t>
             </a:fld>
             <a:endParaRPr lang="en-US" dirty="0"/>
           </a:p>
@@ -4460,7 +4466,7 @@
             <a:fld id="{B61BEF0D-F0BB-DE4B-95CE-6DB70DBA9567}" type="datetimeFigureOut">
               <a:rPr lang="en-US" dirty="0"/>
               <a:pPr/>
-              <a:t>10/10/16</a:t>
+              <a:t>10/10/2016</a:t>
             </a:fld>
             <a:endParaRPr lang="en-US" dirty="0"/>
           </a:p>
@@ -4740,7 +4746,7 @@
             <a:fld id="{B61BEF0D-F0BB-DE4B-95CE-6DB70DBA9567}" type="datetimeFigureOut">
               <a:rPr lang="en-US" dirty="0"/>
               <a:pPr/>
-              <a:t>10/10/16</a:t>
+              <a:t>10/10/2016</a:t>
             </a:fld>
             <a:endParaRPr lang="en-US" dirty="0"/>
           </a:p>
@@ -5028,7 +5034,7 @@
             <a:fld id="{B61BEF0D-F0BB-DE4B-95CE-6DB70DBA9567}" type="datetimeFigureOut">
               <a:rPr lang="en-US" dirty="0"/>
               <a:pPr/>
-              <a:t>10/10/16</a:t>
+              <a:t>10/10/2016</a:t>
             </a:fld>
             <a:endParaRPr lang="en-US" dirty="0"/>
           </a:p>
@@ -5555,7 +5561,7 @@
             <a:fld id="{B61BEF0D-F0BB-DE4B-95CE-6DB70DBA9567}" type="datetimeFigureOut">
               <a:rPr lang="en-US" dirty="0"/>
               <a:pPr/>
-              <a:t>10/10/16</a:t>
+              <a:t>10/10/2016</a:t>
             </a:fld>
             <a:endParaRPr lang="en-US" dirty="0"/>
           </a:p>
@@ -6202,6 +6208,162 @@
 </p:sld>
 </file>
 
+<file path=ppt/slides/slide10.xml><?xml version="1.0" encoding="utf-8"?>
+<p:sld xmlns:a="http://schemas.openxmlformats.org/drawingml/2006/main" xmlns:r="http://schemas.openxmlformats.org/officeDocument/2006/relationships" xmlns:p="http://schemas.openxmlformats.org/presentationml/2006/main">
+  <p:cSld>
+    <p:spTree>
+      <p:nvGrpSpPr>
+        <p:cNvPr id="1" name=""/>
+        <p:cNvGrpSpPr/>
+        <p:nvPr/>
+      </p:nvGrpSpPr>
+      <p:grpSpPr>
+        <a:xfrm>
+          <a:off x="0" y="0"/>
+          <a:ext cx="0" cy="0"/>
+          <a:chOff x="0" y="0"/>
+          <a:chExt cx="0" cy="0"/>
+        </a:xfrm>
+      </p:grpSpPr>
+      <p:sp>
+        <p:nvSpPr>
+          <p:cNvPr id="2" name="Title 1"/>
+          <p:cNvSpPr>
+            <a:spLocks noGrp="1"/>
+          </p:cNvSpPr>
+          <p:nvPr>
+            <p:ph type="title"/>
+          </p:nvPr>
+        </p:nvSpPr>
+        <p:spPr/>
+        <p:txBody>
+          <a:bodyPr/>
+          <a:lstStyle/>
+          <a:p>
+            <a:endParaRPr lang="en-GB"/>
+          </a:p>
+        </p:txBody>
+      </p:sp>
+      <p:pic>
+        <p:nvPicPr>
+          <p:cNvPr id="4" name="Content Placeholder 3"/>
+          <p:cNvPicPr>
+            <a:picLocks noGrp="1" noChangeAspect="1"/>
+          </p:cNvPicPr>
+          <p:nvPr>
+            <p:ph idx="1"/>
+          </p:nvPr>
+        </p:nvPicPr>
+        <p:blipFill>
+          <a:blip r:embed="rId2">
+            <a:extLst>
+              <a:ext uri="{28A0092B-C50C-407E-A947-70E740481C1C}">
+                <a14:useLocalDpi xmlns:a14="http://schemas.microsoft.com/office/drawing/2010/main" val="0"/>
+              </a:ext>
+            </a:extLst>
+          </a:blip>
+          <a:stretch>
+            <a:fillRect/>
+          </a:stretch>
+        </p:blipFill>
+        <p:spPr>
+          <a:xfrm>
+            <a:off x="2771071" y="0"/>
+            <a:ext cx="8731954" cy="6858000"/>
+          </a:xfrm>
+        </p:spPr>
+      </p:pic>
+    </p:spTree>
+    <p:extLst>
+      <p:ext uri="{BB962C8B-B14F-4D97-AF65-F5344CB8AC3E}">
+        <p14:creationId xmlns:p14="http://schemas.microsoft.com/office/powerpoint/2010/main" val="907978320"/>
+      </p:ext>
+    </p:extLst>
+  </p:cSld>
+  <p:clrMapOvr>
+    <a:masterClrMapping/>
+  </p:clrMapOvr>
+</p:sld>
+</file>
+
+<file path=ppt/slides/slide11.xml><?xml version="1.0" encoding="utf-8"?>
+<p:sld xmlns:a="http://schemas.openxmlformats.org/drawingml/2006/main" xmlns:r="http://schemas.openxmlformats.org/officeDocument/2006/relationships" xmlns:p="http://schemas.openxmlformats.org/presentationml/2006/main">
+  <p:cSld>
+    <p:spTree>
+      <p:nvGrpSpPr>
+        <p:cNvPr id="1" name=""/>
+        <p:cNvGrpSpPr/>
+        <p:nvPr/>
+      </p:nvGrpSpPr>
+      <p:grpSpPr>
+        <a:xfrm>
+          <a:off x="0" y="0"/>
+          <a:ext cx="0" cy="0"/>
+          <a:chOff x="0" y="0"/>
+          <a:chExt cx="0" cy="0"/>
+        </a:xfrm>
+      </p:grpSpPr>
+      <p:sp>
+        <p:nvSpPr>
+          <p:cNvPr id="2" name="Title 1"/>
+          <p:cNvSpPr>
+            <a:spLocks noGrp="1"/>
+          </p:cNvSpPr>
+          <p:nvPr>
+            <p:ph type="title"/>
+          </p:nvPr>
+        </p:nvSpPr>
+        <p:spPr/>
+        <p:txBody>
+          <a:bodyPr/>
+          <a:lstStyle/>
+          <a:p>
+            <a:endParaRPr lang="en-GB"/>
+          </a:p>
+        </p:txBody>
+      </p:sp>
+      <p:pic>
+        <p:nvPicPr>
+          <p:cNvPr id="4" name="Content Placeholder 3"/>
+          <p:cNvPicPr>
+            <a:picLocks noGrp="1" noChangeAspect="1"/>
+          </p:cNvPicPr>
+          <p:nvPr>
+            <p:ph idx="1"/>
+          </p:nvPr>
+        </p:nvPicPr>
+        <p:blipFill>
+          <a:blip r:embed="rId2">
+            <a:extLst>
+              <a:ext uri="{28A0092B-C50C-407E-A947-70E740481C1C}">
+                <a14:useLocalDpi xmlns:a14="http://schemas.microsoft.com/office/drawing/2010/main" val="0"/>
+              </a:ext>
+            </a:extLst>
+          </a:blip>
+          <a:stretch>
+            <a:fillRect/>
+          </a:stretch>
+        </p:blipFill>
+        <p:spPr>
+          <a:xfrm>
+            <a:off x="2669622" y="0"/>
+            <a:ext cx="8721231" cy="6858000"/>
+          </a:xfrm>
+        </p:spPr>
+      </p:pic>
+    </p:spTree>
+    <p:extLst>
+      <p:ext uri="{BB962C8B-B14F-4D97-AF65-F5344CB8AC3E}">
+        <p14:creationId xmlns:p14="http://schemas.microsoft.com/office/powerpoint/2010/main" val="3315693259"/>
+      </p:ext>
+    </p:extLst>
+  </p:cSld>
+  <p:clrMapOvr>
+    <a:masterClrMapping/>
+  </p:clrMapOvr>
+</p:sld>
+</file>
+
 <file path=ppt/slides/slide2.xml><?xml version="1.0" encoding="utf-8"?>
 <p:sld xmlns:a="http://schemas.openxmlformats.org/drawingml/2006/main" xmlns:r="http://schemas.openxmlformats.org/officeDocument/2006/relationships" xmlns:p="http://schemas.openxmlformats.org/presentationml/2006/main">
   <p:cSld>
@@ -6394,6 +6556,84 @@
 </file>
 
 <file path=ppt/slides/slide4.xml><?xml version="1.0" encoding="utf-8"?>
+<p:sld xmlns:a="http://schemas.openxmlformats.org/drawingml/2006/main" xmlns:r="http://schemas.openxmlformats.org/officeDocument/2006/relationships" xmlns:p="http://schemas.openxmlformats.org/presentationml/2006/main">
+  <p:cSld>
+    <p:spTree>
+      <p:nvGrpSpPr>
+        <p:cNvPr id="1" name=""/>
+        <p:cNvGrpSpPr/>
+        <p:nvPr/>
+      </p:nvGrpSpPr>
+      <p:grpSpPr>
+        <a:xfrm>
+          <a:off x="0" y="0"/>
+          <a:ext cx="0" cy="0"/>
+          <a:chOff x="0" y="0"/>
+          <a:chExt cx="0" cy="0"/>
+        </a:xfrm>
+      </p:grpSpPr>
+      <p:sp>
+        <p:nvSpPr>
+          <p:cNvPr id="2" name="Title 1"/>
+          <p:cNvSpPr>
+            <a:spLocks noGrp="1"/>
+          </p:cNvSpPr>
+          <p:nvPr>
+            <p:ph type="title"/>
+          </p:nvPr>
+        </p:nvSpPr>
+        <p:spPr/>
+        <p:txBody>
+          <a:bodyPr/>
+          <a:lstStyle/>
+          <a:p>
+            <a:endParaRPr lang="en-GB"/>
+          </a:p>
+        </p:txBody>
+      </p:sp>
+      <p:pic>
+        <p:nvPicPr>
+          <p:cNvPr id="4" name="Content Placeholder 3"/>
+          <p:cNvPicPr>
+            <a:picLocks noGrp="1" noChangeAspect="1"/>
+          </p:cNvPicPr>
+          <p:nvPr>
+            <p:ph idx="1"/>
+          </p:nvPr>
+        </p:nvPicPr>
+        <p:blipFill>
+          <a:blip r:embed="rId2">
+            <a:extLst>
+              <a:ext uri="{28A0092B-C50C-407E-A947-70E740481C1C}">
+                <a14:useLocalDpi xmlns:a14="http://schemas.microsoft.com/office/drawing/2010/main" val="0"/>
+              </a:ext>
+            </a:extLst>
+          </a:blip>
+          <a:stretch>
+            <a:fillRect/>
+          </a:stretch>
+        </p:blipFill>
+        <p:spPr>
+          <a:xfrm>
+            <a:off x="2786746" y="0"/>
+            <a:ext cx="9165768" cy="6857999"/>
+          </a:xfrm>
+        </p:spPr>
+      </p:pic>
+    </p:spTree>
+    <p:extLst>
+      <p:ext uri="{BB962C8B-B14F-4D97-AF65-F5344CB8AC3E}">
+        <p14:creationId xmlns:p14="http://schemas.microsoft.com/office/powerpoint/2010/main" val="1908092878"/>
+      </p:ext>
+    </p:extLst>
+  </p:cSld>
+  <p:clrMapOvr>
+    <a:masterClrMapping/>
+  </p:clrMapOvr>
+</p:sld>
+</file>
+
+<file path=ppt/slides/slide5.xml><?xml version="1.0" encoding="utf-8"?>
 <p:sld xmlns:a="http://schemas.openxmlformats.org/drawingml/2006/main" xmlns:r="http://schemas.openxmlformats.org/officeDocument/2006/relationships" xmlns:p="http://schemas.openxmlformats.org/presentationml/2006/main">
   <p:cSld>
     <p:spTree>
@@ -6471,7 +6711,7 @@
 </p:sld>
 </file>
 
-<file path=ppt/slides/slide5.xml><?xml version="1.0" encoding="utf-8"?>
+<file path=ppt/slides/slide6.xml><?xml version="1.0" encoding="utf-8"?>
 <p:sld xmlns:a="http://schemas.openxmlformats.org/drawingml/2006/main" xmlns:r="http://schemas.openxmlformats.org/officeDocument/2006/relationships" xmlns:p="http://schemas.openxmlformats.org/presentationml/2006/main">
   <p:cSld>
     <p:spTree>
@@ -6534,6 +6774,240 @@
     <p:extLst>
       <p:ext uri="{BB962C8B-B14F-4D97-AF65-F5344CB8AC3E}">
         <p14:creationId xmlns:p14="http://schemas.microsoft.com/office/powerpoint/2010/main" val="416272431"/>
+      </p:ext>
+    </p:extLst>
+  </p:cSld>
+  <p:clrMapOvr>
+    <a:masterClrMapping/>
+  </p:clrMapOvr>
+</p:sld>
+</file>
+
+<file path=ppt/slides/slide7.xml><?xml version="1.0" encoding="utf-8"?>
+<p:sld xmlns:a="http://schemas.openxmlformats.org/drawingml/2006/main" xmlns:r="http://schemas.openxmlformats.org/officeDocument/2006/relationships" xmlns:p="http://schemas.openxmlformats.org/presentationml/2006/main">
+  <p:cSld>
+    <p:spTree>
+      <p:nvGrpSpPr>
+        <p:cNvPr id="1" name=""/>
+        <p:cNvGrpSpPr/>
+        <p:nvPr/>
+      </p:nvGrpSpPr>
+      <p:grpSpPr>
+        <a:xfrm>
+          <a:off x="0" y="0"/>
+          <a:ext cx="0" cy="0"/>
+          <a:chOff x="0" y="0"/>
+          <a:chExt cx="0" cy="0"/>
+        </a:xfrm>
+      </p:grpSpPr>
+      <p:sp>
+        <p:nvSpPr>
+          <p:cNvPr id="2" name="Title 1"/>
+          <p:cNvSpPr>
+            <a:spLocks noGrp="1"/>
+          </p:cNvSpPr>
+          <p:nvPr>
+            <p:ph type="title"/>
+          </p:nvPr>
+        </p:nvSpPr>
+        <p:spPr/>
+        <p:txBody>
+          <a:bodyPr/>
+          <a:lstStyle/>
+          <a:p>
+            <a:endParaRPr lang="en-GB" dirty="0"/>
+          </a:p>
+        </p:txBody>
+      </p:sp>
+      <p:pic>
+        <p:nvPicPr>
+          <p:cNvPr id="4" name="Content Placeholder 3"/>
+          <p:cNvPicPr>
+            <a:picLocks noGrp="1" noChangeAspect="1"/>
+          </p:cNvPicPr>
+          <p:nvPr>
+            <p:ph idx="1"/>
+          </p:nvPr>
+        </p:nvPicPr>
+        <p:blipFill>
+          <a:blip r:embed="rId2">
+            <a:extLst>
+              <a:ext uri="{28A0092B-C50C-407E-A947-70E740481C1C}">
+                <a14:useLocalDpi xmlns:a14="http://schemas.microsoft.com/office/drawing/2010/main" val="0"/>
+              </a:ext>
+            </a:extLst>
+          </a:blip>
+          <a:stretch>
+            <a:fillRect/>
+          </a:stretch>
+        </p:blipFill>
+        <p:spPr>
+          <a:xfrm>
+            <a:off x="2791412" y="0"/>
+            <a:ext cx="8711612" cy="6858000"/>
+          </a:xfrm>
+        </p:spPr>
+      </p:pic>
+    </p:spTree>
+    <p:extLst>
+      <p:ext uri="{BB962C8B-B14F-4D97-AF65-F5344CB8AC3E}">
+        <p14:creationId xmlns:p14="http://schemas.microsoft.com/office/powerpoint/2010/main" val="1888164428"/>
+      </p:ext>
+    </p:extLst>
+  </p:cSld>
+  <p:clrMapOvr>
+    <a:masterClrMapping/>
+  </p:clrMapOvr>
+</p:sld>
+</file>
+
+<file path=ppt/slides/slide8.xml><?xml version="1.0" encoding="utf-8"?>
+<p:sld xmlns:a="http://schemas.openxmlformats.org/drawingml/2006/main" xmlns:r="http://schemas.openxmlformats.org/officeDocument/2006/relationships" xmlns:p="http://schemas.openxmlformats.org/presentationml/2006/main">
+  <p:cSld>
+    <p:spTree>
+      <p:nvGrpSpPr>
+        <p:cNvPr id="1" name=""/>
+        <p:cNvGrpSpPr/>
+        <p:nvPr/>
+      </p:nvGrpSpPr>
+      <p:grpSpPr>
+        <a:xfrm>
+          <a:off x="0" y="0"/>
+          <a:ext cx="0" cy="0"/>
+          <a:chOff x="0" y="0"/>
+          <a:chExt cx="0" cy="0"/>
+        </a:xfrm>
+      </p:grpSpPr>
+      <p:sp>
+        <p:nvSpPr>
+          <p:cNvPr id="2" name="Title 1"/>
+          <p:cNvSpPr>
+            <a:spLocks noGrp="1"/>
+          </p:cNvSpPr>
+          <p:nvPr>
+            <p:ph type="title"/>
+          </p:nvPr>
+        </p:nvSpPr>
+        <p:spPr/>
+        <p:txBody>
+          <a:bodyPr/>
+          <a:lstStyle/>
+          <a:p>
+            <a:endParaRPr lang="en-GB"/>
+          </a:p>
+        </p:txBody>
+      </p:sp>
+      <p:pic>
+        <p:nvPicPr>
+          <p:cNvPr id="4" name="Content Placeholder 3"/>
+          <p:cNvPicPr>
+            <a:picLocks noGrp="1" noChangeAspect="1"/>
+          </p:cNvPicPr>
+          <p:nvPr>
+            <p:ph idx="1"/>
+          </p:nvPr>
+        </p:nvPicPr>
+        <p:blipFill>
+          <a:blip r:embed="rId2">
+            <a:extLst>
+              <a:ext uri="{28A0092B-C50C-407E-A947-70E740481C1C}">
+                <a14:useLocalDpi xmlns:a14="http://schemas.microsoft.com/office/drawing/2010/main" val="0"/>
+              </a:ext>
+            </a:extLst>
+          </a:blip>
+          <a:stretch>
+            <a:fillRect/>
+          </a:stretch>
+        </p:blipFill>
+        <p:spPr>
+          <a:xfrm>
+            <a:off x="2744167" y="0"/>
+            <a:ext cx="8758857" cy="6858000"/>
+          </a:xfrm>
+        </p:spPr>
+      </p:pic>
+    </p:spTree>
+    <p:extLst>
+      <p:ext uri="{BB962C8B-B14F-4D97-AF65-F5344CB8AC3E}">
+        <p14:creationId xmlns:p14="http://schemas.microsoft.com/office/powerpoint/2010/main" val="3334730814"/>
+      </p:ext>
+    </p:extLst>
+  </p:cSld>
+  <p:clrMapOvr>
+    <a:masterClrMapping/>
+  </p:clrMapOvr>
+</p:sld>
+</file>
+
+<file path=ppt/slides/slide9.xml><?xml version="1.0" encoding="utf-8"?>
+<p:sld xmlns:a="http://schemas.openxmlformats.org/drawingml/2006/main" xmlns:r="http://schemas.openxmlformats.org/officeDocument/2006/relationships" xmlns:p="http://schemas.openxmlformats.org/presentationml/2006/main">
+  <p:cSld>
+    <p:spTree>
+      <p:nvGrpSpPr>
+        <p:cNvPr id="1" name=""/>
+        <p:cNvGrpSpPr/>
+        <p:nvPr/>
+      </p:nvGrpSpPr>
+      <p:grpSpPr>
+        <a:xfrm>
+          <a:off x="0" y="0"/>
+          <a:ext cx="0" cy="0"/>
+          <a:chOff x="0" y="0"/>
+          <a:chExt cx="0" cy="0"/>
+        </a:xfrm>
+      </p:grpSpPr>
+      <p:sp>
+        <p:nvSpPr>
+          <p:cNvPr id="2" name="Title 1"/>
+          <p:cNvSpPr>
+            <a:spLocks noGrp="1"/>
+          </p:cNvSpPr>
+          <p:nvPr>
+            <p:ph type="title"/>
+          </p:nvPr>
+        </p:nvSpPr>
+        <p:spPr/>
+        <p:txBody>
+          <a:bodyPr/>
+          <a:lstStyle/>
+          <a:p>
+            <a:endParaRPr lang="en-GB" dirty="0"/>
+          </a:p>
+        </p:txBody>
+      </p:sp>
+      <p:pic>
+        <p:nvPicPr>
+          <p:cNvPr id="4" name="Content Placeholder 3"/>
+          <p:cNvPicPr>
+            <a:picLocks noGrp="1" noChangeAspect="1"/>
+          </p:cNvPicPr>
+          <p:nvPr>
+            <p:ph idx="1"/>
+          </p:nvPr>
+        </p:nvPicPr>
+        <p:blipFill>
+          <a:blip r:embed="rId2">
+            <a:extLst>
+              <a:ext uri="{28A0092B-C50C-407E-A947-70E740481C1C}">
+                <a14:useLocalDpi xmlns:a14="http://schemas.microsoft.com/office/drawing/2010/main" val="0"/>
+              </a:ext>
+            </a:extLst>
+          </a:blip>
+          <a:stretch>
+            <a:fillRect/>
+          </a:stretch>
+        </p:blipFill>
+        <p:spPr>
+          <a:xfrm>
+            <a:off x="2697578" y="0"/>
+            <a:ext cx="8805446" cy="6858000"/>
+          </a:xfrm>
+        </p:spPr>
+      </p:pic>
+    </p:spTree>
+    <p:extLst>
+      <p:ext uri="{BB962C8B-B14F-4D97-AF65-F5344CB8AC3E}">
+        <p14:creationId xmlns:p14="http://schemas.microsoft.com/office/powerpoint/2010/main" val="570517262"/>
       </p:ext>
     </p:extLst>
   </p:cSld>
@@ -6586,7 +7060,7 @@
     </a:clrScheme>
     <a:fontScheme name="Parallax">
       <a:majorFont>
-        <a:latin typeface="Corbel" panose="020B0503020204020204"/>
+        <a:latin typeface="Corbel"/>
         <a:ea typeface=""/>
         <a:cs typeface=""/>
         <a:font script="Jpan" typeface="HGｺﾞｼｯｸM"/>
@@ -6621,7 +7095,7 @@
         <a:font script="Geor" typeface="Sylfaen"/>
       </a:majorFont>
       <a:minorFont>
-        <a:latin typeface="Corbel" panose="020B0503020204020204"/>
+        <a:latin typeface="Corbel"/>
         <a:ea typeface=""/>
         <a:cs typeface=""/>
         <a:font script="Jpan" typeface="HGｺﾞｼｯｸM"/>
@@ -6793,7 +7267,7 @@
   <a:extraClrSchemeLst/>
   <a:extLst>
     <a:ext uri="{05A4C25C-085E-4340-85A3-A5531E510DB2}">
-      <thm15:themeFamily xmlns:thm15="http://schemas.microsoft.com/office/thememl/2012/main" name="Parallax" id="{3388167B-A2EB-4685-9635-1831D9AEF8C4}" vid="{4F7A876A-7598-49CA-AFC8-8EDA2551E4A7}"/>
+      <thm15:themeFamily xmlns="" xmlns:thm15="http://schemas.microsoft.com/office/thememl/2012/main" name="Parallax" id="{3388167B-A2EB-4685-9635-1831D9AEF8C4}" vid="{4F7A876A-7598-49CA-AFC8-8EDA2551E4A7}"/>
     </a:ext>
   </a:extLst>
 </a:theme>

</xml_diff>